<commit_message>
Update Presentation Time Series.pptx
</commit_message>
<xml_diff>
--- a/Presentation Time Series.pptx
+++ b/Presentation Time Series.pptx
@@ -124,6 +124,11 @@
       </a:defRPr>
     </a:lvl9pPr>
   </p:defaultTextStyle>
+  <p:extLst>
+    <p:ext uri="{EFAFB233-063F-42B5-8137-9DF3F51BA10A}">
+      <p15:sldGuideLst xmlns:p15="http://schemas.microsoft.com/office/powerpoint/2012/main"/>
+    </p:ext>
+  </p:extLst>
 </p:presentation>
 </file>
 
@@ -4905,8 +4910,8 @@
         </p:blipFill>
         <p:spPr>
           <a:xfrm>
-            <a:off x="6772275" y="1244599"/>
-            <a:ext cx="5229225" cy="5006155"/>
+            <a:off x="4389541" y="1244597"/>
+            <a:ext cx="3590924" cy="5006155"/>
           </a:xfrm>
           <a:prstGeom prst="rect">
             <a:avLst/>
@@ -4942,7 +4947,37 @@
         <p:spPr>
           <a:xfrm>
             <a:off x="266700" y="1244599"/>
-            <a:ext cx="5229225" cy="5006155"/>
+            <a:ext cx="3590925" cy="5006155"/>
+          </a:xfrm>
+          <a:prstGeom prst="rect">
+            <a:avLst/>
+          </a:prstGeom>
+        </p:spPr>
+      </p:pic>
+      <p:pic>
+        <p:nvPicPr>
+          <p:cNvPr id="5" name="Picture 4">
+            <a:extLst>
+              <a:ext uri="{FF2B5EF4-FFF2-40B4-BE49-F238E27FC236}">
+                <a16:creationId xmlns:a16="http://schemas.microsoft.com/office/drawing/2014/main" id="{66F1C366-657F-4452-AE58-C094CC29F62C}"/>
+              </a:ext>
+            </a:extLst>
+          </p:cNvPr>
+          <p:cNvPicPr>
+            <a:picLocks noChangeAspect="1"/>
+          </p:cNvPicPr>
+          <p:nvPr/>
+        </p:nvPicPr>
+        <p:blipFill>
+          <a:blip r:embed="rId4"/>
+          <a:stretch>
+            <a:fillRect/>
+          </a:stretch>
+        </p:blipFill>
+        <p:spPr>
+          <a:xfrm>
+            <a:off x="8636203" y="1244598"/>
+            <a:ext cx="3590924" cy="5006155"/>
           </a:xfrm>
           <a:prstGeom prst="rect">
             <a:avLst/>

</xml_diff>